<commit_message>
Added The Project Poster
</commit_message>
<xml_diff>
--- a/Helping Files/Project Poster Official.pptx
+++ b/Helping Files/Project Poster Official.pptx
@@ -195,6 +195,7 @@
           <a:p>
             <a:fld id="{A5FCE79D-976F-4D3F-9104-35B40FE6FCEF}" type="datetimeFigureOut">
               <a:rPr lang="en-US" smtClean="0"/>
+              <a:pPr/>
               <a:t>5/28/2015</a:t>
             </a:fld>
             <a:endParaRPr lang="en-US"/>
@@ -356,6 +357,7 @@
           <a:p>
             <a:fld id="{633A08D2-F1D0-4E86-8FBD-4BD0EFDACDBE}" type="slidenum">
               <a:rPr lang="en-US" smtClean="0"/>
+              <a:pPr/>
               <a:t>‹#›</a:t>
             </a:fld>
             <a:endParaRPr lang="en-US"/>
@@ -527,6 +529,7 @@
           <a:p>
             <a:fld id="{633A08D2-F1D0-4E86-8FBD-4BD0EFDACDBE}" type="slidenum">
               <a:rPr lang="en-US" smtClean="0"/>
+              <a:pPr/>
               <a:t>1</a:t>
             </a:fld>
             <a:endParaRPr lang="en-US"/>
@@ -1456,7 +1459,7 @@
     </p:spTree>
     <p:extLst>
       <p:ext uri="{BB962C8B-B14F-4D97-AF65-F5344CB8AC3E}">
-        <p14:creationId xmlns:p14="http://schemas.microsoft.com/office/powerpoint/2010/main" xmlns="" val="439848810"/>
+        <p14:creationId xmlns="" xmlns:p14="http://schemas.microsoft.com/office/powerpoint/2010/main" val="439848810"/>
       </p:ext>
     </p:extLst>
   </p:cSld>
@@ -8813,7 +8816,7 @@
     </p:spTree>
     <p:extLst>
       <p:ext uri="{BB962C8B-B14F-4D97-AF65-F5344CB8AC3E}">
-        <p14:creationId xmlns:p14="http://schemas.microsoft.com/office/powerpoint/2010/main" xmlns="" val="439848810"/>
+        <p14:creationId xmlns="" xmlns:p14="http://schemas.microsoft.com/office/powerpoint/2010/main" val="439848810"/>
       </p:ext>
     </p:extLst>
   </p:cSld>
@@ -9779,7 +9782,7 @@
     </p:spTree>
     <p:extLst>
       <p:ext uri="{BB962C8B-B14F-4D97-AF65-F5344CB8AC3E}">
-        <p14:creationId xmlns:p14="http://schemas.microsoft.com/office/powerpoint/2010/main" xmlns="" val="2135137342"/>
+        <p14:creationId xmlns="" xmlns:p14="http://schemas.microsoft.com/office/powerpoint/2010/main" val="2135137342"/>
       </p:ext>
     </p:extLst>
   </p:cSld>
@@ -10750,7 +10753,7 @@
     </p:spTree>
     <p:extLst>
       <p:ext uri="{BB962C8B-B14F-4D97-AF65-F5344CB8AC3E}">
-        <p14:creationId xmlns:p14="http://schemas.microsoft.com/office/powerpoint/2010/main" xmlns="" val="355620590"/>
+        <p14:creationId xmlns="" xmlns:p14="http://schemas.microsoft.com/office/powerpoint/2010/main" val="355620590"/>
       </p:ext>
     </p:extLst>
   </p:cSld>
@@ -11722,7 +11725,7 @@
     </p:spTree>
     <p:extLst>
       <p:ext uri="{BB962C8B-B14F-4D97-AF65-F5344CB8AC3E}">
-        <p14:creationId xmlns:p14="http://schemas.microsoft.com/office/powerpoint/2010/main" xmlns="" val="1318592895"/>
+        <p14:creationId xmlns="" xmlns:p14="http://schemas.microsoft.com/office/powerpoint/2010/main" val="1318592895"/>
       </p:ext>
     </p:extLst>
   </p:cSld>
@@ -16987,7 +16990,7 @@
               <p:nvPr userDrawn="1">
                 <p:extLst>
                   <p:ext uri="{D42A27DB-BD31-4B8C-83A1-F6EECF244321}">
-                    <p14:modId xmlns:p14="http://schemas.microsoft.com/office/powerpoint/2010/main" xmlns="" val="3337683908"/>
+                    <p14:modId xmlns="" xmlns:p14="http://schemas.microsoft.com/office/powerpoint/2010/main" val="3337683908"/>
                   </p:ext>
                 </p:extLst>
               </p:nvPr>
@@ -17013,7 +17016,7 @@
               <p:nvPr userDrawn="1">
                 <p:extLst>
                   <p:ext uri="{D42A27DB-BD31-4B8C-83A1-F6EECF244321}">
-                    <p14:modId xmlns:p14="http://schemas.microsoft.com/office/powerpoint/2010/main" xmlns="" val="2987105662"/>
+                    <p14:modId xmlns="" xmlns:p14="http://schemas.microsoft.com/office/powerpoint/2010/main" val="2987105662"/>
                   </p:ext>
                 </p:extLst>
               </p:nvPr>
@@ -18004,7 +18007,7 @@
             <p:nvPr userDrawn="1">
               <p:extLst>
                 <p:ext uri="{D42A27DB-BD31-4B8C-83A1-F6EECF244321}">
-                  <p14:modId xmlns:p14="http://schemas.microsoft.com/office/powerpoint/2010/main" xmlns="" val="1740339869"/>
+                  <p14:modId xmlns="" xmlns:p14="http://schemas.microsoft.com/office/powerpoint/2010/main" val="1740339869"/>
                 </p:ext>
               </p:extLst>
             </p:nvPr>
@@ -18057,7 +18060,7 @@
             <p:nvPr userDrawn="1">
               <p:extLst>
                 <p:ext uri="{D42A27DB-BD31-4B8C-83A1-F6EECF244321}">
-                  <p14:modId xmlns:p14="http://schemas.microsoft.com/office/powerpoint/2010/main" xmlns="" val="1402631973"/>
+                  <p14:modId xmlns="" xmlns:p14="http://schemas.microsoft.com/office/powerpoint/2010/main" val="1402631973"/>
                 </p:ext>
               </p:extLst>
             </p:nvPr>
@@ -18231,7 +18234,7 @@
           <a:blip r:embed="rId14" cstate="print">
             <a:extLst>
               <a:ext uri="{28A0092B-C50C-407E-A947-70E740481C1C}">
-                <a14:useLocalDpi xmlns:a14="http://schemas.microsoft.com/office/drawing/2010/main" xmlns="" val="0"/>
+                <a14:useLocalDpi xmlns="" xmlns:a14="http://schemas.microsoft.com/office/drawing/2010/main" val="0"/>
               </a:ext>
             </a:extLst>
           </a:blip>
@@ -18251,7 +18254,7 @@
           <a:noFill/>
           <a:extLst>
             <a:ext uri="{909E8E84-426E-40DD-AFC4-6F175D3DCCD1}">
-              <a14:hiddenFill xmlns:a14="http://schemas.microsoft.com/office/drawing/2010/main" xmlns="">
+              <a14:hiddenFill xmlns="" xmlns:a14="http://schemas.microsoft.com/office/drawing/2010/main">
                 <a:solidFill>
                   <a:srgbClr val="FFFFFF"/>
                 </a:solidFill>
@@ -18395,7 +18398,7 @@
           <a:blip r:embed="rId15" cstate="print">
             <a:extLst>
               <a:ext uri="{28A0092B-C50C-407E-A947-70E740481C1C}">
-                <a14:useLocalDpi xmlns:a14="http://schemas.microsoft.com/office/drawing/2010/main" xmlns="" val="0"/>
+                <a14:useLocalDpi xmlns="" xmlns:a14="http://schemas.microsoft.com/office/drawing/2010/main" val="0"/>
               </a:ext>
             </a:extLst>
           </a:blip>
@@ -18416,7 +18419,7 @@
     </p:spTree>
     <p:extLst>
       <p:ext uri="{BB962C8B-B14F-4D97-AF65-F5344CB8AC3E}">
-        <p14:creationId xmlns:p14="http://schemas.microsoft.com/office/powerpoint/2010/main" xmlns="" val="2189407646"/>
+        <p14:creationId xmlns="" xmlns:p14="http://schemas.microsoft.com/office/powerpoint/2010/main" val="2189407646"/>
       </p:ext>
     </p:extLst>
   </p:cSld>
@@ -19961,7 +19964,7 @@
               <p:nvPr userDrawn="1">
                 <p:extLst>
                   <p:ext uri="{D42A27DB-BD31-4B8C-83A1-F6EECF244321}">
-                    <p14:modId xmlns:p14="http://schemas.microsoft.com/office/powerpoint/2010/main" xmlns="" val="2140081004"/>
+                    <p14:modId xmlns="" xmlns:p14="http://schemas.microsoft.com/office/powerpoint/2010/main" val="2140081004"/>
                   </p:ext>
                 </p:extLst>
               </p:nvPr>
@@ -19987,7 +19990,7 @@
               <p:nvPr userDrawn="1">
                 <p:extLst>
                   <p:ext uri="{D42A27DB-BD31-4B8C-83A1-F6EECF244321}">
-                    <p14:modId xmlns:p14="http://schemas.microsoft.com/office/powerpoint/2010/main" xmlns="" val="3686549449"/>
+                    <p14:modId xmlns="" xmlns:p14="http://schemas.microsoft.com/office/powerpoint/2010/main" val="3686549449"/>
                   </p:ext>
                 </p:extLst>
               </p:nvPr>
@@ -20978,7 +20981,7 @@
             <p:nvPr userDrawn="1">
               <p:extLst>
                 <p:ext uri="{D42A27DB-BD31-4B8C-83A1-F6EECF244321}">
-                  <p14:modId xmlns:p14="http://schemas.microsoft.com/office/powerpoint/2010/main" xmlns="" val="2344550967"/>
+                  <p14:modId xmlns="" xmlns:p14="http://schemas.microsoft.com/office/powerpoint/2010/main" val="2344550967"/>
                 </p:ext>
               </p:extLst>
             </p:nvPr>
@@ -21031,7 +21034,7 @@
             <p:nvPr userDrawn="1">
               <p:extLst>
                 <p:ext uri="{D42A27DB-BD31-4B8C-83A1-F6EECF244321}">
-                  <p14:modId xmlns:p14="http://schemas.microsoft.com/office/powerpoint/2010/main" xmlns="" val="1113941401"/>
+                  <p14:modId xmlns="" xmlns:p14="http://schemas.microsoft.com/office/powerpoint/2010/main" val="1113941401"/>
                 </p:ext>
               </p:extLst>
             </p:nvPr>
@@ -21205,7 +21208,7 @@
           <a:blip r:embed="rId13" cstate="print">
             <a:extLst>
               <a:ext uri="{28A0092B-C50C-407E-A947-70E740481C1C}">
-                <a14:useLocalDpi xmlns:a14="http://schemas.microsoft.com/office/drawing/2010/main" xmlns="" val="0"/>
+                <a14:useLocalDpi xmlns="" xmlns:a14="http://schemas.microsoft.com/office/drawing/2010/main" val="0"/>
               </a:ext>
             </a:extLst>
           </a:blip>
@@ -21225,7 +21228,7 @@
           <a:noFill/>
           <a:extLst>
             <a:ext uri="{909E8E84-426E-40DD-AFC4-6F175D3DCCD1}">
-              <a14:hiddenFill xmlns:a14="http://schemas.microsoft.com/office/drawing/2010/main" xmlns="">
+              <a14:hiddenFill xmlns="" xmlns:a14="http://schemas.microsoft.com/office/drawing/2010/main">
                 <a:solidFill>
                   <a:srgbClr val="FFFFFF"/>
                 </a:solidFill>
@@ -21410,7 +21413,7 @@
           <a:blip r:embed="rId14" cstate="print">
             <a:extLst>
               <a:ext uri="{28A0092B-C50C-407E-A947-70E740481C1C}">
-                <a14:useLocalDpi xmlns:a14="http://schemas.microsoft.com/office/drawing/2010/main" xmlns="" val="0"/>
+                <a14:useLocalDpi xmlns="" xmlns:a14="http://schemas.microsoft.com/office/drawing/2010/main" val="0"/>
               </a:ext>
             </a:extLst>
           </a:blip>
@@ -21431,7 +21434,7 @@
     </p:spTree>
     <p:extLst>
       <p:ext uri="{BB962C8B-B14F-4D97-AF65-F5344CB8AC3E}">
-        <p14:creationId xmlns:p14="http://schemas.microsoft.com/office/powerpoint/2010/main" xmlns="" val="3388600629"/>
+        <p14:creationId xmlns="" xmlns:p14="http://schemas.microsoft.com/office/powerpoint/2010/main" val="3388600629"/>
       </p:ext>
     </p:extLst>
   </p:cSld>
@@ -22975,7 +22978,7 @@
               <p:nvPr userDrawn="1">
                 <p:extLst>
                   <p:ext uri="{D42A27DB-BD31-4B8C-83A1-F6EECF244321}">
-                    <p14:modId xmlns:p14="http://schemas.microsoft.com/office/powerpoint/2010/main" xmlns="" val="3838789985"/>
+                    <p14:modId xmlns="" xmlns:p14="http://schemas.microsoft.com/office/powerpoint/2010/main" val="3838789985"/>
                   </p:ext>
                 </p:extLst>
               </p:nvPr>
@@ -23001,7 +23004,7 @@
               <p:nvPr userDrawn="1">
                 <p:extLst>
                   <p:ext uri="{D42A27DB-BD31-4B8C-83A1-F6EECF244321}">
-                    <p14:modId xmlns:p14="http://schemas.microsoft.com/office/powerpoint/2010/main" xmlns="" val="195376788"/>
+                    <p14:modId xmlns="" xmlns:p14="http://schemas.microsoft.com/office/powerpoint/2010/main" val="195376788"/>
                   </p:ext>
                 </p:extLst>
               </p:nvPr>
@@ -23992,7 +23995,7 @@
             <p:nvPr userDrawn="1">
               <p:extLst>
                 <p:ext uri="{D42A27DB-BD31-4B8C-83A1-F6EECF244321}">
-                  <p14:modId xmlns:p14="http://schemas.microsoft.com/office/powerpoint/2010/main" xmlns="" val="827898972"/>
+                  <p14:modId xmlns="" xmlns:p14="http://schemas.microsoft.com/office/powerpoint/2010/main" val="827898972"/>
                 </p:ext>
               </p:extLst>
             </p:nvPr>
@@ -24045,7 +24048,7 @@
             <p:nvPr userDrawn="1">
               <p:extLst>
                 <p:ext uri="{D42A27DB-BD31-4B8C-83A1-F6EECF244321}">
-                  <p14:modId xmlns:p14="http://schemas.microsoft.com/office/powerpoint/2010/main" xmlns="" val="1903822826"/>
+                  <p14:modId xmlns="" xmlns:p14="http://schemas.microsoft.com/office/powerpoint/2010/main" val="1903822826"/>
                 </p:ext>
               </p:extLst>
             </p:nvPr>
@@ -24219,7 +24222,7 @@
           <a:blip r:embed="rId13" cstate="print">
             <a:extLst>
               <a:ext uri="{28A0092B-C50C-407E-A947-70E740481C1C}">
-                <a14:useLocalDpi xmlns:a14="http://schemas.microsoft.com/office/drawing/2010/main" xmlns="" val="0"/>
+                <a14:useLocalDpi xmlns="" xmlns:a14="http://schemas.microsoft.com/office/drawing/2010/main" val="0"/>
               </a:ext>
             </a:extLst>
           </a:blip>
@@ -24239,7 +24242,7 @@
           <a:noFill/>
           <a:extLst>
             <a:ext uri="{909E8E84-426E-40DD-AFC4-6F175D3DCCD1}">
-              <a14:hiddenFill xmlns:a14="http://schemas.microsoft.com/office/drawing/2010/main" xmlns="">
+              <a14:hiddenFill xmlns="" xmlns:a14="http://schemas.microsoft.com/office/drawing/2010/main">
                 <a:solidFill>
                   <a:srgbClr val="FFFFFF"/>
                 </a:solidFill>
@@ -24395,7 +24398,7 @@
           <a:blip r:embed="rId14" cstate="print">
             <a:extLst>
               <a:ext uri="{28A0092B-C50C-407E-A947-70E740481C1C}">
-                <a14:useLocalDpi xmlns:a14="http://schemas.microsoft.com/office/drawing/2010/main" xmlns="" val="0"/>
+                <a14:useLocalDpi xmlns="" xmlns:a14="http://schemas.microsoft.com/office/drawing/2010/main" val="0"/>
               </a:ext>
             </a:extLst>
           </a:blip>
@@ -24416,7 +24419,7 @@
     </p:spTree>
     <p:extLst>
       <p:ext uri="{BB962C8B-B14F-4D97-AF65-F5344CB8AC3E}">
-        <p14:creationId xmlns:p14="http://schemas.microsoft.com/office/powerpoint/2010/main" xmlns="" val="118203387"/>
+        <p14:creationId xmlns="" xmlns:p14="http://schemas.microsoft.com/office/powerpoint/2010/main" val="118203387"/>
       </p:ext>
     </p:extLst>
   </p:cSld>
@@ -28138,7 +28141,6 @@
               <a:rPr lang="en-US" sz="1750" dirty="0" smtClean="0"/>
               <a:t>chess</a:t>
             </a:r>
-            <a:endParaRPr lang="en-US" sz="1750" dirty="0" smtClean="0"/>
           </a:p>
           <a:p>
             <a:endParaRPr lang="en-US" sz="1750" u="sng" dirty="0" smtClean="0"/>
@@ -28275,13 +28277,8 @@
             <a:pPr defTabSz="5143500"/>
             <a:r>
               <a:rPr lang="en-US" sz="2000" dirty="0" smtClean="0"/>
-              <a:t>I had to first build the Map and the Country clas</a:t>
+              <a:t>I had to first build the Map and the Country class in order to even be able to start creating the input system. After I created the basic Map and Country classes I began to work on the input system. As it grew I needed to add methods to the country class the would return the proper items that could be inputted. Simply put I started with small classes and as more classes got added I added the necessary methods to the correct classes. After I create the input system and finish the logic to resolve all of the commands, I will add some nice features to the game such as saving games or a server.</a:t>
             </a:r>
-            <a:r>
-              <a:rPr lang="en-US" sz="2000" dirty="0" smtClean="0"/>
-              <a:t>s in order to even be able to start creating the input system. After I created the basic Map and Country classes I began to work on the input system. As it grew I needed to add methods to the country class the would return the proper items that could be inputted. Simply put I started with small classes and as more classes got added I added the necessary methods to the correct classes. After I create the input system and finish the logic to resolve all of the commands, I will add some nice features to the game such as saving games or a server.</a:t>
-            </a:r>
-            <a:endParaRPr lang="en-US" sz="2000" dirty="0" smtClean="0"/>
           </a:p>
         </p:txBody>
       </p:sp>
@@ -28325,11 +28322,7 @@
           <a:p>
             <a:r>
               <a:rPr lang="en-US" dirty="0" smtClean="0"/>
-              <a:t>WORK </a:t>
-            </a:r>
-            <a:r>
-              <a:rPr lang="en-US" dirty="0" smtClean="0"/>
-              <a:t>PROCESS</a:t>
+              <a:t>WORK PROCESS</a:t>
             </a:r>
             <a:endParaRPr lang="en-US" dirty="0"/>
           </a:p>
@@ -28399,11 +28392,7 @@
           <a:p>
             <a:r>
               <a:rPr lang="en-US" sz="2000" dirty="0" smtClean="0"/>
-              <a:t>A foreseen</a:t>
-            </a:r>
-            <a:r>
-              <a:rPr lang="en-US" sz="2000" dirty="0" smtClean="0"/>
-              <a:t> challenge of this game is creating a loop that can iterate through all of the commands and figure out which commands succeed and which one fails because all commands are executed simultaneously. If a unit is attacked its attack is canceled but creating a system that can catch if there is a loop of attacks (A attacks B, B attacks C, C attacks A) may be difficult to identify in my program. Also properly testing the logic for %100 accuracy will be time consuming. Creating a system for removing and adding units will also be tough to do in a neat and simple way.</a:t>
+              <a:t>A foreseen challenge of this game is creating a loop that can iterate through all of the commands and figure out which commands succeed and which one fails because all commands are executed simultaneously. If a unit is attacked its attack is canceled but creating a system that can catch if there is a loop of attacks (A attacks B, B attacks C, C attacks A) may be difficult to identify in my program. Also properly testing the logic for %100 accuracy will be time consuming. Creating a system for removing and adding units will also be tough to do in a neat and simple way.</a:t>
             </a:r>
             <a:endParaRPr lang="en-US" sz="2000" dirty="0"/>
           </a:p>
@@ -28639,6 +28628,10 @@
           <a:bodyPr/>
           <a:lstStyle/>
           <a:p>
+            <a:r>
+              <a:rPr lang="en-US" dirty="0" smtClean="0"/>
+              <a:t>Computer Science, Roosevelt High School, Seattle, WA</a:t>
+            </a:r>
             <a:endParaRPr lang="en-US" dirty="0"/>
           </a:p>
         </p:txBody>
@@ -30042,7 +30035,7 @@
           <a:blip r:embed="rId3" cstate="print">
             <a:extLst>
               <a:ext uri="{28A0092B-C50C-407E-A947-70E740481C1C}">
-                <a14:useLocalDpi xmlns:a14="http://schemas.microsoft.com/office/drawing/2010/main" xmlns="" val="0"/>
+                <a14:useLocalDpi xmlns="" xmlns:a14="http://schemas.microsoft.com/office/drawing/2010/main" val="0"/>
               </a:ext>
             </a:extLst>
           </a:blip>
@@ -30063,14 +30056,14 @@
           </a:ln>
           <a:extLst>
             <a:ext uri="{909E8E84-426E-40DD-AFC4-6F175D3DCCD1}">
-              <a14:hiddenFill xmlns:a14="http://schemas.microsoft.com/office/drawing/2010/main" xmlns="">
+              <a14:hiddenFill xmlns="" xmlns:a14="http://schemas.microsoft.com/office/drawing/2010/main">
                 <a:solidFill>
                   <a:schemeClr val="accent1"/>
                 </a:solidFill>
               </a14:hiddenFill>
             </a:ext>
             <a:ext uri="{91240B29-F687-4F45-9708-019B960494DF}">
-              <a14:hiddenLine xmlns:a14="http://schemas.microsoft.com/office/drawing/2010/main" xmlns="" w="9525">
+              <a14:hiddenLine xmlns="" xmlns:a14="http://schemas.microsoft.com/office/drawing/2010/main" w="9525">
                 <a:solidFill>
                   <a:schemeClr val="tx1"/>
                 </a:solidFill>
@@ -30316,10 +30309,58 @@
           </a:p>
         </p:txBody>
       </p:sp>
+      <p:pic>
+        <p:nvPicPr>
+          <p:cNvPr id="61" name="Picture 60" descr="Belarusarmyrollover.png"/>
+          <p:cNvPicPr>
+            <a:picLocks noChangeAspect="1"/>
+          </p:cNvPicPr>
+          <p:nvPr/>
+        </p:nvPicPr>
+        <p:blipFill>
+          <a:blip r:embed="rId10" cstate="print"/>
+          <a:stretch>
+            <a:fillRect/>
+          </a:stretch>
+        </p:blipFill>
+        <p:spPr>
+          <a:xfrm rot="21430855">
+            <a:off x="5432133" y="2155533"/>
+            <a:ext cx="914400" cy="914400"/>
+          </a:xfrm>
+          <a:prstGeom prst="rect">
+            <a:avLst/>
+          </a:prstGeom>
+        </p:spPr>
+      </p:pic>
+      <p:pic>
+        <p:nvPicPr>
+          <p:cNvPr id="62" name="Picture 61" descr="Russianavy.png"/>
+          <p:cNvPicPr>
+            <a:picLocks noChangeAspect="1"/>
+          </p:cNvPicPr>
+          <p:nvPr/>
+        </p:nvPicPr>
+        <p:blipFill>
+          <a:blip r:embed="rId11" cstate="print"/>
+          <a:stretch>
+            <a:fillRect/>
+          </a:stretch>
+        </p:blipFill>
+        <p:spPr>
+          <a:xfrm rot="347899">
+            <a:off x="22218051" y="2329851"/>
+            <a:ext cx="914400" cy="914400"/>
+          </a:xfrm>
+          <a:prstGeom prst="rect">
+            <a:avLst/>
+          </a:prstGeom>
+        </p:spPr>
+      </p:pic>
     </p:spTree>
     <p:extLst>
       <p:ext uri="{BB962C8B-B14F-4D97-AF65-F5344CB8AC3E}">
-        <p14:creationId xmlns:p14="http://schemas.microsoft.com/office/powerpoint/2010/main" xmlns="" val="2550174280"/>
+        <p14:creationId xmlns="" xmlns:p14="http://schemas.microsoft.com/office/powerpoint/2010/main" val="2550174280"/>
       </p:ext>
     </p:extLst>
   </p:cSld>

</xml_diff>

<commit_message>
I finalized the poster
</commit_message>
<xml_diff>
--- a/Helping Files/Project Poster Official.pptx
+++ b/Helping Files/Project Poster Official.pptx
@@ -196,7 +196,7 @@
             <a:fld id="{A5FCE79D-976F-4D3F-9104-35B40FE6FCEF}" type="datetimeFigureOut">
               <a:rPr lang="en-US" smtClean="0"/>
               <a:pPr/>
-              <a:t>5/28/2015</a:t>
+              <a:t>5/29/2015</a:t>
             </a:fld>
             <a:endParaRPr lang="en-US"/>
           </a:p>
@@ -365,6 +365,11 @@
         </p:txBody>
       </p:sp>
     </p:spTree>
+    <p:extLst>
+      <p:ext uri="{BB962C8B-B14F-4D97-AF65-F5344CB8AC3E}">
+        <p14:creationId xmlns:p14="http://schemas.microsoft.com/office/powerpoint/2010/main" val="4156659981"/>
+      </p:ext>
+    </p:extLst>
   </p:cSld>
   <p:clrMap bg1="lt1" tx1="dk1" bg2="lt2" tx2="dk2" accent1="accent1" accent2="accent2" accent3="accent3" accent4="accent4" accent5="accent5" accent6="accent6" hlink="hlink" folHlink="folHlink"/>
   <p:notesStyle>
@@ -1459,7 +1464,7 @@
     </p:spTree>
     <p:extLst>
       <p:ext uri="{BB962C8B-B14F-4D97-AF65-F5344CB8AC3E}">
-        <p14:creationId xmlns="" xmlns:p14="http://schemas.microsoft.com/office/powerpoint/2010/main" val="439848810"/>
+        <p14:creationId xmlns:p14="http://schemas.microsoft.com/office/powerpoint/2010/main" val="439848810"/>
       </p:ext>
     </p:extLst>
   </p:cSld>
@@ -1534,7 +1539,7 @@
             <a:fld id="{E3127EC2-47FB-48A1-8644-C8A81DDAA119}" type="datetime4">
               <a:rPr lang="en-US" smtClean="0"/>
               <a:pPr/>
-              <a:t>May 28, 2015</a:t>
+              <a:t>May 29, 2015</a:t>
             </a:fld>
             <a:endParaRPr lang="en-US"/>
           </a:p>
@@ -1626,7 +1631,7 @@
             <a:fld id="{AE3EC3ED-7435-49F9-84C8-03CCA2F8DEDB}" type="datetime4">
               <a:rPr lang="en-US" smtClean="0"/>
               <a:pPr/>
-              <a:t>May 28, 2015</a:t>
+              <a:t>May 29, 2015</a:t>
             </a:fld>
             <a:endParaRPr lang="en-US"/>
           </a:p>
@@ -4279,7 +4284,7 @@
             <a:fld id="{3FC49BF1-FCD3-4395-8FF6-0047AF66228E}" type="datetime4">
               <a:rPr lang="en-US" smtClean="0"/>
               <a:pPr/>
-              <a:t>May 28, 2015</a:t>
+              <a:t>May 29, 2015</a:t>
             </a:fld>
             <a:endParaRPr lang="en-US"/>
           </a:p>
@@ -7493,7 +7498,7 @@
             <a:fld id="{CA861222-2C8B-4501-BE87-6797EC025925}" type="datetime4">
               <a:rPr lang="en-US" smtClean="0"/>
               <a:pPr/>
-              <a:t>May 28, 2015</a:t>
+              <a:t>May 29, 2015</a:t>
             </a:fld>
             <a:endParaRPr lang="en-US"/>
           </a:p>
@@ -7667,7 +7672,7 @@
             <a:fld id="{A2FB5AFD-D735-4504-A039-ADEBB6448D55}" type="datetime4">
               <a:rPr lang="en-US" smtClean="0"/>
               <a:pPr/>
-              <a:t>May 28, 2015</a:t>
+              <a:t>May 29, 2015</a:t>
             </a:fld>
             <a:endParaRPr lang="en-US"/>
           </a:p>
@@ -7844,7 +7849,7 @@
             <a:fld id="{AB5C8118-FB93-4E87-B380-0175F2FE2167}" type="datetime4">
               <a:rPr lang="en-US" smtClean="0"/>
               <a:pPr/>
-              <a:t>May 28, 2015</a:t>
+              <a:t>May 29, 2015</a:t>
             </a:fld>
             <a:endParaRPr lang="en-US"/>
           </a:p>
@@ -8816,7 +8821,7 @@
     </p:spTree>
     <p:extLst>
       <p:ext uri="{BB962C8B-B14F-4D97-AF65-F5344CB8AC3E}">
-        <p14:creationId xmlns="" xmlns:p14="http://schemas.microsoft.com/office/powerpoint/2010/main" val="439848810"/>
+        <p14:creationId xmlns:p14="http://schemas.microsoft.com/office/powerpoint/2010/main" val="439848810"/>
       </p:ext>
     </p:extLst>
   </p:cSld>
@@ -9782,7 +9787,7 @@
     </p:spTree>
     <p:extLst>
       <p:ext uri="{BB962C8B-B14F-4D97-AF65-F5344CB8AC3E}">
-        <p14:creationId xmlns="" xmlns:p14="http://schemas.microsoft.com/office/powerpoint/2010/main" val="2135137342"/>
+        <p14:creationId xmlns:p14="http://schemas.microsoft.com/office/powerpoint/2010/main" val="2135137342"/>
       </p:ext>
     </p:extLst>
   </p:cSld>
@@ -10753,7 +10758,7 @@
     </p:spTree>
     <p:extLst>
       <p:ext uri="{BB962C8B-B14F-4D97-AF65-F5344CB8AC3E}">
-        <p14:creationId xmlns="" xmlns:p14="http://schemas.microsoft.com/office/powerpoint/2010/main" val="355620590"/>
+        <p14:creationId xmlns:p14="http://schemas.microsoft.com/office/powerpoint/2010/main" val="355620590"/>
       </p:ext>
     </p:extLst>
   </p:cSld>
@@ -11725,7 +11730,7 @@
     </p:spTree>
     <p:extLst>
       <p:ext uri="{BB962C8B-B14F-4D97-AF65-F5344CB8AC3E}">
-        <p14:creationId xmlns="" xmlns:p14="http://schemas.microsoft.com/office/powerpoint/2010/main" val="1318592895"/>
+        <p14:creationId xmlns:p14="http://schemas.microsoft.com/office/powerpoint/2010/main" val="1318592895"/>
       </p:ext>
     </p:extLst>
   </p:cSld>
@@ -14500,7 +14505,7 @@
             <a:fld id="{0A98AF03-7270-45C2-A683-C5E353EF01A5}" type="datetime4">
               <a:rPr lang="en-US" smtClean="0"/>
               <a:pPr/>
-              <a:t>May 28, 2015</a:t>
+              <a:t>May 29, 2015</a:t>
             </a:fld>
             <a:endParaRPr lang="en-US" dirty="0"/>
           </a:p>
@@ -14787,7 +14792,7 @@
             <a:fld id="{05A93482-8E69-40F7-BCAD-5662A6CADB27}" type="datetime4">
               <a:rPr lang="en-US" smtClean="0"/>
               <a:pPr/>
-              <a:t>May 28, 2015</a:t>
+              <a:t>May 29, 2015</a:t>
             </a:fld>
             <a:endParaRPr lang="en-US"/>
           </a:p>
@@ -15030,7 +15035,7 @@
             <a:fld id="{FBB7EAE1-CAAC-4AEF-919E-158692B1E55E}" type="datetime4">
               <a:rPr lang="en-US" smtClean="0"/>
               <a:pPr/>
-              <a:t>May 28, 2015</a:t>
+              <a:t>May 29, 2015</a:t>
             </a:fld>
             <a:endParaRPr lang="en-US"/>
           </a:p>
@@ -15145,7 +15150,7 @@
             <a:fld id="{9525A706-D8F2-4D1A-855A-CADC92600C26}" type="datetime4">
               <a:rPr lang="en-US" smtClean="0"/>
               <a:pPr/>
-              <a:t>May 28, 2015</a:t>
+              <a:t>May 29, 2015</a:t>
             </a:fld>
             <a:endParaRPr lang="en-US"/>
           </a:p>
@@ -15686,7 +15691,7 @@
             <a:fld id="{99B4F123-1704-49AC-9D15-C4B1462B8014}" type="datetime4">
               <a:rPr lang="en-US" smtClean="0"/>
               <a:pPr/>
-              <a:t>May 28, 2015</a:t>
+              <a:t>May 29, 2015</a:t>
             </a:fld>
             <a:endParaRPr lang="en-US"/>
           </a:p>
@@ -16990,7 +16995,7 @@
               <p:nvPr userDrawn="1">
                 <p:extLst>
                   <p:ext uri="{D42A27DB-BD31-4B8C-83A1-F6EECF244321}">
-                    <p14:modId xmlns="" xmlns:p14="http://schemas.microsoft.com/office/powerpoint/2010/main" val="3337683908"/>
+                    <p14:modId xmlns:p14="http://schemas.microsoft.com/office/powerpoint/2010/main" val="3337683908"/>
                   </p:ext>
                 </p:extLst>
               </p:nvPr>
@@ -17001,9 +17006,59 @@
             </p:xfrm>
             <a:graphic>
               <a:graphicData uri="http://schemas.openxmlformats.org/presentationml/2006/ole">
-                <p:oleObj spid="_x0000_s7202" name="Image" r:id="rId9" imgW="1828571" imgH="1117460" progId="">
-                  <p:embed/>
-                </p:oleObj>
+                <mc:AlternateContent xmlns:mc="http://schemas.openxmlformats.org/markup-compatibility/2006">
+                  <mc:Choice xmlns:v="urn:schemas-microsoft-com:vml" Requires="v">
+                    <p:oleObj spid="_x0000_s7210" name="Image" r:id="rId9" imgW="1828571" imgH="1117460" progId="">
+                      <p:embed/>
+                    </p:oleObj>
+                  </mc:Choice>
+                  <mc:Fallback>
+                    <p:oleObj name="Image" r:id="rId9" imgW="1828571" imgH="1117460" progId="">
+                      <p:embed/>
+                      <p:pic>
+                        <p:nvPicPr>
+                          <p:cNvPr id="0" name="Picture 34"/>
+                          <p:cNvPicPr>
+                            <a:picLocks noChangeAspect="1" noChangeArrowheads="1"/>
+                          </p:cNvPicPr>
+                          <p:nvPr/>
+                        </p:nvPicPr>
+                        <p:blipFill>
+                          <a:blip r:embed="rId10">
+                            <a:extLst>
+                              <a:ext uri="{28A0092B-C50C-407E-A947-70E740481C1C}">
+                                <a14:useLocalDpi xmlns:a14="http://schemas.microsoft.com/office/drawing/2010/main" val="0"/>
+                              </a:ext>
+                            </a:extLst>
+                          </a:blip>
+                          <a:srcRect/>
+                          <a:stretch>
+                            <a:fillRect/>
+                          </a:stretch>
+                        </p:blipFill>
+                        <p:spPr bwMode="auto">
+                          <a:xfrm>
+                            <a:off x="-4533347" y="12734142"/>
+                            <a:ext cx="1828800" cy="1117600"/>
+                          </a:xfrm>
+                          <a:prstGeom prst="rect">
+                            <a:avLst/>
+                          </a:prstGeom>
+                          <a:noFill/>
+                          <a:extLst>
+                            <a:ext uri="{909E8E84-426E-40DD-AFC4-6F175D3DCCD1}">
+                              <a14:hiddenFill xmlns:a14="http://schemas.microsoft.com/office/drawing/2010/main">
+                                <a:solidFill>
+                                  <a:srgbClr val="FFFFFF"/>
+                                </a:solidFill>
+                              </a14:hiddenFill>
+                            </a:ext>
+                          </a:extLst>
+                        </p:spPr>
+                      </p:pic>
+                    </p:oleObj>
+                  </mc:Fallback>
+                </mc:AlternateContent>
               </a:graphicData>
             </a:graphic>
           </p:graphicFrame>
@@ -17016,7 +17071,7 @@
               <p:nvPr userDrawn="1">
                 <p:extLst>
                   <p:ext uri="{D42A27DB-BD31-4B8C-83A1-F6EECF244321}">
-                    <p14:modId xmlns="" xmlns:p14="http://schemas.microsoft.com/office/powerpoint/2010/main" val="2987105662"/>
+                    <p14:modId xmlns:p14="http://schemas.microsoft.com/office/powerpoint/2010/main" val="2987105662"/>
                   </p:ext>
                 </p:extLst>
               </p:nvPr>
@@ -17027,9 +17082,59 @@
             </p:xfrm>
             <a:graphic>
               <a:graphicData uri="http://schemas.openxmlformats.org/presentationml/2006/ole">
-                <p:oleObj spid="_x0000_s7203" name="Image" r:id="rId10" imgW="1828571" imgH="1117460" progId="">
-                  <p:embed/>
-                </p:oleObj>
+                <mc:AlternateContent xmlns:mc="http://schemas.openxmlformats.org/markup-compatibility/2006">
+                  <mc:Choice xmlns:v="urn:schemas-microsoft-com:vml" Requires="v">
+                    <p:oleObj spid="_x0000_s7211" name="Image" r:id="rId11" imgW="1828571" imgH="1117460" progId="">
+                      <p:embed/>
+                    </p:oleObj>
+                  </mc:Choice>
+                  <mc:Fallback>
+                    <p:oleObj name="Image" r:id="rId11" imgW="1828571" imgH="1117460" progId="">
+                      <p:embed/>
+                      <p:pic>
+                        <p:nvPicPr>
+                          <p:cNvPr id="0" name="Picture 35"/>
+                          <p:cNvPicPr>
+                            <a:picLocks noChangeAspect="1" noChangeArrowheads="1"/>
+                          </p:cNvPicPr>
+                          <p:nvPr/>
+                        </p:nvPicPr>
+                        <p:blipFill>
+                          <a:blip r:embed="rId12">
+                            <a:extLst>
+                              <a:ext uri="{28A0092B-C50C-407E-A947-70E740481C1C}">
+                                <a14:useLocalDpi xmlns:a14="http://schemas.microsoft.com/office/drawing/2010/main" val="0"/>
+                              </a:ext>
+                            </a:extLst>
+                          </a:blip>
+                          <a:srcRect/>
+                          <a:stretch>
+                            <a:fillRect/>
+                          </a:stretch>
+                        </p:blipFill>
+                        <p:spPr bwMode="auto">
+                          <a:xfrm>
+                            <a:off x="-2456641" y="12737835"/>
+                            <a:ext cx="1828800" cy="1117600"/>
+                          </a:xfrm>
+                          <a:prstGeom prst="rect">
+                            <a:avLst/>
+                          </a:prstGeom>
+                          <a:noFill/>
+                          <a:extLst>
+                            <a:ext uri="{909E8E84-426E-40DD-AFC4-6F175D3DCCD1}">
+                              <a14:hiddenFill xmlns:a14="http://schemas.microsoft.com/office/drawing/2010/main">
+                                <a:solidFill>
+                                  <a:srgbClr val="FFFFFF"/>
+                                </a:solidFill>
+                              </a14:hiddenFill>
+                            </a:ext>
+                          </a:extLst>
+                        </p:spPr>
+                      </p:pic>
+                    </p:oleObj>
+                  </mc:Fallback>
+                </mc:AlternateContent>
               </a:graphicData>
             </a:graphic>
           </p:graphicFrame>
@@ -18007,7 +18112,7 @@
             <p:nvPr userDrawn="1">
               <p:extLst>
                 <p:ext uri="{D42A27DB-BD31-4B8C-83A1-F6EECF244321}">
-                  <p14:modId xmlns="" xmlns:p14="http://schemas.microsoft.com/office/powerpoint/2010/main" val="1740339869"/>
+                  <p14:modId xmlns:p14="http://schemas.microsoft.com/office/powerpoint/2010/main" val="1740339869"/>
                 </p:ext>
               </p:extLst>
             </p:nvPr>
@@ -18018,9 +18123,59 @@
           </p:xfrm>
           <a:graphic>
             <a:graphicData uri="http://schemas.openxmlformats.org/presentationml/2006/ole">
-              <p:oleObj spid="_x0000_s7204" name="Image" r:id="rId11" imgW="4571429" imgH="1688889" progId="">
-                <p:embed/>
-              </p:oleObj>
+              <mc:AlternateContent xmlns:mc="http://schemas.openxmlformats.org/markup-compatibility/2006">
+                <mc:Choice xmlns:v="urn:schemas-microsoft-com:vml" Requires="v">
+                  <p:oleObj spid="_x0000_s7212" name="Image" r:id="rId13" imgW="4571429" imgH="1688889" progId="">
+                    <p:embed/>
+                  </p:oleObj>
+                </mc:Choice>
+                <mc:Fallback>
+                  <p:oleObj name="Image" r:id="rId13" imgW="4571429" imgH="1688889" progId="">
+                    <p:embed/>
+                    <p:pic>
+                      <p:nvPicPr>
+                        <p:cNvPr id="0" name="Picture 36"/>
+                        <p:cNvPicPr>
+                          <a:picLocks noChangeAspect="1" noChangeArrowheads="1"/>
+                        </p:cNvPicPr>
+                        <p:nvPr/>
+                      </p:nvPicPr>
+                      <p:blipFill>
+                        <a:blip r:embed="rId14">
+                          <a:extLst>
+                            <a:ext uri="{28A0092B-C50C-407E-A947-70E740481C1C}">
+                              <a14:useLocalDpi xmlns:a14="http://schemas.microsoft.com/office/drawing/2010/main" val="0"/>
+                            </a:ext>
+                          </a:extLst>
+                        </a:blip>
+                        <a:srcRect/>
+                        <a:stretch>
+                          <a:fillRect/>
+                        </a:stretch>
+                      </p:blipFill>
+                      <p:spPr bwMode="auto">
+                        <a:xfrm>
+                          <a:off x="46915679" y="3672008"/>
+                          <a:ext cx="5586150" cy="2063772"/>
+                        </a:xfrm>
+                        <a:prstGeom prst="rect">
+                          <a:avLst/>
+                        </a:prstGeom>
+                        <a:noFill/>
+                        <a:extLst>
+                          <a:ext uri="{909E8E84-426E-40DD-AFC4-6F175D3DCCD1}">
+                            <a14:hiddenFill xmlns:a14="http://schemas.microsoft.com/office/drawing/2010/main">
+                              <a:solidFill>
+                                <a:srgbClr val="FFFFFF"/>
+                              </a:solidFill>
+                            </a14:hiddenFill>
+                          </a:ext>
+                        </a:extLst>
+                      </p:spPr>
+                    </p:pic>
+                  </p:oleObj>
+                </mc:Fallback>
+              </mc:AlternateContent>
             </a:graphicData>
           </a:graphic>
         </p:graphicFrame>
@@ -18033,7 +18188,7 @@
             <p:nvPr userDrawn="1"/>
           </p:nvPicPr>
           <p:blipFill>
-            <a:blip r:embed="rId12" cstate="print"/>
+            <a:blip r:embed="rId15" cstate="print"/>
             <a:stretch>
               <a:fillRect/>
             </a:stretch>
@@ -18060,7 +18215,7 @@
             <p:nvPr userDrawn="1">
               <p:extLst>
                 <p:ext uri="{D42A27DB-BD31-4B8C-83A1-F6EECF244321}">
-                  <p14:modId xmlns="" xmlns:p14="http://schemas.microsoft.com/office/powerpoint/2010/main" val="1402631973"/>
+                  <p14:modId xmlns:p14="http://schemas.microsoft.com/office/powerpoint/2010/main" val="1402631973"/>
                 </p:ext>
               </p:extLst>
             </p:nvPr>
@@ -18071,9 +18226,59 @@
           </p:xfrm>
           <a:graphic>
             <a:graphicData uri="http://schemas.openxmlformats.org/presentationml/2006/ole">
-              <p:oleObj spid="_x0000_s7205" name="Image" r:id="rId13" imgW="1574603" imgH="1053968" progId="">
-                <p:embed/>
-              </p:oleObj>
+              <mc:AlternateContent xmlns:mc="http://schemas.openxmlformats.org/markup-compatibility/2006">
+                <mc:Choice xmlns:v="urn:schemas-microsoft-com:vml" Requires="v">
+                  <p:oleObj spid="_x0000_s7213" name="Image" r:id="rId16" imgW="1574603" imgH="1053968" progId="">
+                    <p:embed/>
+                  </p:oleObj>
+                </mc:Choice>
+                <mc:Fallback>
+                  <p:oleObj name="Image" r:id="rId16" imgW="1574603" imgH="1053968" progId="">
+                    <p:embed/>
+                    <p:pic>
+                      <p:nvPicPr>
+                        <p:cNvPr id="0" name="Picture 37"/>
+                        <p:cNvPicPr>
+                          <a:picLocks noChangeAspect="1" noChangeArrowheads="1"/>
+                        </p:cNvPicPr>
+                        <p:nvPr/>
+                      </p:nvPicPr>
+                      <p:blipFill>
+                        <a:blip r:embed="rId17">
+                          <a:extLst>
+                            <a:ext uri="{28A0092B-C50C-407E-A947-70E740481C1C}">
+                              <a14:useLocalDpi xmlns:a14="http://schemas.microsoft.com/office/drawing/2010/main" val="0"/>
+                            </a:ext>
+                          </a:extLst>
+                        </a:blip>
+                        <a:srcRect/>
+                        <a:stretch>
+                          <a:fillRect/>
+                        </a:stretch>
+                      </p:blipFill>
+                      <p:spPr bwMode="auto">
+                        <a:xfrm>
+                          <a:off x="44629619" y="12347263"/>
+                          <a:ext cx="1482266" cy="992162"/>
+                        </a:xfrm>
+                        <a:prstGeom prst="rect">
+                          <a:avLst/>
+                        </a:prstGeom>
+                        <a:noFill/>
+                        <a:extLst>
+                          <a:ext uri="{909E8E84-426E-40DD-AFC4-6F175D3DCCD1}">
+                            <a14:hiddenFill xmlns:a14="http://schemas.microsoft.com/office/drawing/2010/main">
+                              <a:solidFill>
+                                <a:srgbClr val="FFFFFF"/>
+                              </a:solidFill>
+                            </a14:hiddenFill>
+                          </a:ext>
+                        </a:extLst>
+                      </p:spPr>
+                    </p:pic>
+                  </p:oleObj>
+                </mc:Fallback>
+              </mc:AlternateContent>
             </a:graphicData>
           </a:graphic>
         </p:graphicFrame>
@@ -18231,10 +18436,10 @@
           <p:nvPr/>
         </p:nvPicPr>
         <p:blipFill>
-          <a:blip r:embed="rId14" cstate="print">
+          <a:blip r:embed="rId18" cstate="print">
             <a:extLst>
               <a:ext uri="{28A0092B-C50C-407E-A947-70E740481C1C}">
-                <a14:useLocalDpi xmlns="" xmlns:a14="http://schemas.microsoft.com/office/drawing/2010/main" val="0"/>
+                <a14:useLocalDpi xmlns:a14="http://schemas.microsoft.com/office/drawing/2010/main" val="0"/>
               </a:ext>
             </a:extLst>
           </a:blip>
@@ -18254,7 +18459,7 @@
           <a:noFill/>
           <a:extLst>
             <a:ext uri="{909E8E84-426E-40DD-AFC4-6F175D3DCCD1}">
-              <a14:hiddenFill xmlns="" xmlns:a14="http://schemas.microsoft.com/office/drawing/2010/main">
+              <a14:hiddenFill xmlns:a14="http://schemas.microsoft.com/office/drawing/2010/main">
                 <a:solidFill>
                   <a:srgbClr val="FFFFFF"/>
                 </a:solidFill>
@@ -18395,10 +18600,10 @@
           <p:nvPr/>
         </p:nvPicPr>
         <p:blipFill>
-          <a:blip r:embed="rId15" cstate="print">
+          <a:blip r:embed="rId19" cstate="print">
             <a:extLst>
               <a:ext uri="{28A0092B-C50C-407E-A947-70E740481C1C}">
-                <a14:useLocalDpi xmlns="" xmlns:a14="http://schemas.microsoft.com/office/drawing/2010/main" val="0"/>
+                <a14:useLocalDpi xmlns:a14="http://schemas.microsoft.com/office/drawing/2010/main" val="0"/>
               </a:ext>
             </a:extLst>
           </a:blip>
@@ -18419,7 +18624,7 @@
     </p:spTree>
     <p:extLst>
       <p:ext uri="{BB962C8B-B14F-4D97-AF65-F5344CB8AC3E}">
-        <p14:creationId xmlns="" xmlns:p14="http://schemas.microsoft.com/office/powerpoint/2010/main" val="2189407646"/>
+        <p14:creationId xmlns:p14="http://schemas.microsoft.com/office/powerpoint/2010/main" val="2189407646"/>
       </p:ext>
     </p:extLst>
   </p:cSld>
@@ -19964,7 +20169,7 @@
               <p:nvPr userDrawn="1">
                 <p:extLst>
                   <p:ext uri="{D42A27DB-BD31-4B8C-83A1-F6EECF244321}">
-                    <p14:modId xmlns="" xmlns:p14="http://schemas.microsoft.com/office/powerpoint/2010/main" val="2140081004"/>
+                    <p14:modId xmlns:p14="http://schemas.microsoft.com/office/powerpoint/2010/main" val="2140081004"/>
                   </p:ext>
                 </p:extLst>
               </p:nvPr>
@@ -19975,9 +20180,59 @@
             </p:xfrm>
             <a:graphic>
               <a:graphicData uri="http://schemas.openxmlformats.org/presentationml/2006/ole">
-                <p:oleObj spid="_x0000_s5158" name="Image" r:id="rId8" imgW="1828571" imgH="1117460" progId="">
-                  <p:embed/>
-                </p:oleObj>
+                <mc:AlternateContent xmlns:mc="http://schemas.openxmlformats.org/markup-compatibility/2006">
+                  <mc:Choice xmlns:v="urn:schemas-microsoft-com:vml" Requires="v">
+                    <p:oleObj spid="_x0000_s5166" name="Image" r:id="rId8" imgW="1828571" imgH="1117460" progId="">
+                      <p:embed/>
+                    </p:oleObj>
+                  </mc:Choice>
+                  <mc:Fallback>
+                    <p:oleObj name="Image" r:id="rId8" imgW="1828571" imgH="1117460" progId="">
+                      <p:embed/>
+                      <p:pic>
+                        <p:nvPicPr>
+                          <p:cNvPr id="0" name="Picture 38"/>
+                          <p:cNvPicPr>
+                            <a:picLocks noChangeAspect="1" noChangeArrowheads="1"/>
+                          </p:cNvPicPr>
+                          <p:nvPr/>
+                        </p:nvPicPr>
+                        <p:blipFill>
+                          <a:blip r:embed="rId9">
+                            <a:extLst>
+                              <a:ext uri="{28A0092B-C50C-407E-A947-70E740481C1C}">
+                                <a14:useLocalDpi xmlns:a14="http://schemas.microsoft.com/office/drawing/2010/main" val="0"/>
+                              </a:ext>
+                            </a:extLst>
+                          </a:blip>
+                          <a:srcRect/>
+                          <a:stretch>
+                            <a:fillRect/>
+                          </a:stretch>
+                        </p:blipFill>
+                        <p:spPr bwMode="auto">
+                          <a:xfrm>
+                            <a:off x="-4533347" y="12734142"/>
+                            <a:ext cx="1828800" cy="1117600"/>
+                          </a:xfrm>
+                          <a:prstGeom prst="rect">
+                            <a:avLst/>
+                          </a:prstGeom>
+                          <a:noFill/>
+                          <a:extLst>
+                            <a:ext uri="{909E8E84-426E-40DD-AFC4-6F175D3DCCD1}">
+                              <a14:hiddenFill xmlns:a14="http://schemas.microsoft.com/office/drawing/2010/main">
+                                <a:solidFill>
+                                  <a:srgbClr val="FFFFFF"/>
+                                </a:solidFill>
+                              </a14:hiddenFill>
+                            </a:ext>
+                          </a:extLst>
+                        </p:spPr>
+                      </p:pic>
+                    </p:oleObj>
+                  </mc:Fallback>
+                </mc:AlternateContent>
               </a:graphicData>
             </a:graphic>
           </p:graphicFrame>
@@ -19990,7 +20245,7 @@
               <p:nvPr userDrawn="1">
                 <p:extLst>
                   <p:ext uri="{D42A27DB-BD31-4B8C-83A1-F6EECF244321}">
-                    <p14:modId xmlns="" xmlns:p14="http://schemas.microsoft.com/office/powerpoint/2010/main" val="3686549449"/>
+                    <p14:modId xmlns:p14="http://schemas.microsoft.com/office/powerpoint/2010/main" val="3686549449"/>
                   </p:ext>
                 </p:extLst>
               </p:nvPr>
@@ -20001,9 +20256,59 @@
             </p:xfrm>
             <a:graphic>
               <a:graphicData uri="http://schemas.openxmlformats.org/presentationml/2006/ole">
-                <p:oleObj spid="_x0000_s5159" name="Image" r:id="rId9" imgW="1828571" imgH="1117460" progId="">
-                  <p:embed/>
-                </p:oleObj>
+                <mc:AlternateContent xmlns:mc="http://schemas.openxmlformats.org/markup-compatibility/2006">
+                  <mc:Choice xmlns:v="urn:schemas-microsoft-com:vml" Requires="v">
+                    <p:oleObj spid="_x0000_s5167" name="Image" r:id="rId10" imgW="1828571" imgH="1117460" progId="">
+                      <p:embed/>
+                    </p:oleObj>
+                  </mc:Choice>
+                  <mc:Fallback>
+                    <p:oleObj name="Image" r:id="rId10" imgW="1828571" imgH="1117460" progId="">
+                      <p:embed/>
+                      <p:pic>
+                        <p:nvPicPr>
+                          <p:cNvPr id="0" name="Picture 39"/>
+                          <p:cNvPicPr>
+                            <a:picLocks noChangeAspect="1" noChangeArrowheads="1"/>
+                          </p:cNvPicPr>
+                          <p:nvPr/>
+                        </p:nvPicPr>
+                        <p:blipFill>
+                          <a:blip r:embed="rId11">
+                            <a:extLst>
+                              <a:ext uri="{28A0092B-C50C-407E-A947-70E740481C1C}">
+                                <a14:useLocalDpi xmlns:a14="http://schemas.microsoft.com/office/drawing/2010/main" val="0"/>
+                              </a:ext>
+                            </a:extLst>
+                          </a:blip>
+                          <a:srcRect/>
+                          <a:stretch>
+                            <a:fillRect/>
+                          </a:stretch>
+                        </p:blipFill>
+                        <p:spPr bwMode="auto">
+                          <a:xfrm>
+                            <a:off x="-2456641" y="12737835"/>
+                            <a:ext cx="1828800" cy="1117600"/>
+                          </a:xfrm>
+                          <a:prstGeom prst="rect">
+                            <a:avLst/>
+                          </a:prstGeom>
+                          <a:noFill/>
+                          <a:extLst>
+                            <a:ext uri="{909E8E84-426E-40DD-AFC4-6F175D3DCCD1}">
+                              <a14:hiddenFill xmlns:a14="http://schemas.microsoft.com/office/drawing/2010/main">
+                                <a:solidFill>
+                                  <a:srgbClr val="FFFFFF"/>
+                                </a:solidFill>
+                              </a14:hiddenFill>
+                            </a:ext>
+                          </a:extLst>
+                        </p:spPr>
+                      </p:pic>
+                    </p:oleObj>
+                  </mc:Fallback>
+                </mc:AlternateContent>
               </a:graphicData>
             </a:graphic>
           </p:graphicFrame>
@@ -20981,7 +21286,7 @@
             <p:nvPr userDrawn="1">
               <p:extLst>
                 <p:ext uri="{D42A27DB-BD31-4B8C-83A1-F6EECF244321}">
-                  <p14:modId xmlns="" xmlns:p14="http://schemas.microsoft.com/office/powerpoint/2010/main" val="2344550967"/>
+                  <p14:modId xmlns:p14="http://schemas.microsoft.com/office/powerpoint/2010/main" val="2344550967"/>
                 </p:ext>
               </p:extLst>
             </p:nvPr>
@@ -20992,9 +21297,59 @@
           </p:xfrm>
           <a:graphic>
             <a:graphicData uri="http://schemas.openxmlformats.org/presentationml/2006/ole">
-              <p:oleObj spid="_x0000_s5160" name="Image" r:id="rId10" imgW="4571429" imgH="1688889" progId="">
-                <p:embed/>
-              </p:oleObj>
+              <mc:AlternateContent xmlns:mc="http://schemas.openxmlformats.org/markup-compatibility/2006">
+                <mc:Choice xmlns:v="urn:schemas-microsoft-com:vml" Requires="v">
+                  <p:oleObj spid="_x0000_s5168" name="Image" r:id="rId12" imgW="4571429" imgH="1688889" progId="">
+                    <p:embed/>
+                  </p:oleObj>
+                </mc:Choice>
+                <mc:Fallback>
+                  <p:oleObj name="Image" r:id="rId12" imgW="4571429" imgH="1688889" progId="">
+                    <p:embed/>
+                    <p:pic>
+                      <p:nvPicPr>
+                        <p:cNvPr id="0" name="Picture 40"/>
+                        <p:cNvPicPr>
+                          <a:picLocks noChangeAspect="1" noChangeArrowheads="1"/>
+                        </p:cNvPicPr>
+                        <p:nvPr/>
+                      </p:nvPicPr>
+                      <p:blipFill>
+                        <a:blip r:embed="rId13">
+                          <a:extLst>
+                            <a:ext uri="{28A0092B-C50C-407E-A947-70E740481C1C}">
+                              <a14:useLocalDpi xmlns:a14="http://schemas.microsoft.com/office/drawing/2010/main" val="0"/>
+                            </a:ext>
+                          </a:extLst>
+                        </a:blip>
+                        <a:srcRect/>
+                        <a:stretch>
+                          <a:fillRect/>
+                        </a:stretch>
+                      </p:blipFill>
+                      <p:spPr bwMode="auto">
+                        <a:xfrm>
+                          <a:off x="46915679" y="3672008"/>
+                          <a:ext cx="5586150" cy="2063772"/>
+                        </a:xfrm>
+                        <a:prstGeom prst="rect">
+                          <a:avLst/>
+                        </a:prstGeom>
+                        <a:noFill/>
+                        <a:extLst>
+                          <a:ext uri="{909E8E84-426E-40DD-AFC4-6F175D3DCCD1}">
+                            <a14:hiddenFill xmlns:a14="http://schemas.microsoft.com/office/drawing/2010/main">
+                              <a:solidFill>
+                                <a:srgbClr val="FFFFFF"/>
+                              </a:solidFill>
+                            </a14:hiddenFill>
+                          </a:ext>
+                        </a:extLst>
+                      </p:spPr>
+                    </p:pic>
+                  </p:oleObj>
+                </mc:Fallback>
+              </mc:AlternateContent>
             </a:graphicData>
           </a:graphic>
         </p:graphicFrame>
@@ -21007,7 +21362,7 @@
             <p:nvPr userDrawn="1"/>
           </p:nvPicPr>
           <p:blipFill>
-            <a:blip r:embed="rId11" cstate="print"/>
+            <a:blip r:embed="rId14" cstate="print"/>
             <a:stretch>
               <a:fillRect/>
             </a:stretch>
@@ -21034,7 +21389,7 @@
             <p:nvPr userDrawn="1">
               <p:extLst>
                 <p:ext uri="{D42A27DB-BD31-4B8C-83A1-F6EECF244321}">
-                  <p14:modId xmlns="" xmlns:p14="http://schemas.microsoft.com/office/powerpoint/2010/main" val="1113941401"/>
+                  <p14:modId xmlns:p14="http://schemas.microsoft.com/office/powerpoint/2010/main" val="1113941401"/>
                 </p:ext>
               </p:extLst>
             </p:nvPr>
@@ -21045,9 +21400,59 @@
           </p:xfrm>
           <a:graphic>
             <a:graphicData uri="http://schemas.openxmlformats.org/presentationml/2006/ole">
-              <p:oleObj spid="_x0000_s5161" name="Image" r:id="rId12" imgW="1574603" imgH="1053968" progId="">
-                <p:embed/>
-              </p:oleObj>
+              <mc:AlternateContent xmlns:mc="http://schemas.openxmlformats.org/markup-compatibility/2006">
+                <mc:Choice xmlns:v="urn:schemas-microsoft-com:vml" Requires="v">
+                  <p:oleObj spid="_x0000_s5169" name="Image" r:id="rId15" imgW="1574603" imgH="1053968" progId="">
+                    <p:embed/>
+                  </p:oleObj>
+                </mc:Choice>
+                <mc:Fallback>
+                  <p:oleObj name="Image" r:id="rId15" imgW="1574603" imgH="1053968" progId="">
+                    <p:embed/>
+                    <p:pic>
+                      <p:nvPicPr>
+                        <p:cNvPr id="0" name="Picture 41"/>
+                        <p:cNvPicPr>
+                          <a:picLocks noChangeAspect="1" noChangeArrowheads="1"/>
+                        </p:cNvPicPr>
+                        <p:nvPr/>
+                      </p:nvPicPr>
+                      <p:blipFill>
+                        <a:blip r:embed="rId16">
+                          <a:extLst>
+                            <a:ext uri="{28A0092B-C50C-407E-A947-70E740481C1C}">
+                              <a14:useLocalDpi xmlns:a14="http://schemas.microsoft.com/office/drawing/2010/main" val="0"/>
+                            </a:ext>
+                          </a:extLst>
+                        </a:blip>
+                        <a:srcRect/>
+                        <a:stretch>
+                          <a:fillRect/>
+                        </a:stretch>
+                      </p:blipFill>
+                      <p:spPr bwMode="auto">
+                        <a:xfrm>
+                          <a:off x="44629619" y="12347263"/>
+                          <a:ext cx="1482266" cy="992162"/>
+                        </a:xfrm>
+                        <a:prstGeom prst="rect">
+                          <a:avLst/>
+                        </a:prstGeom>
+                        <a:noFill/>
+                        <a:extLst>
+                          <a:ext uri="{909E8E84-426E-40DD-AFC4-6F175D3DCCD1}">
+                            <a14:hiddenFill xmlns:a14="http://schemas.microsoft.com/office/drawing/2010/main">
+                              <a:solidFill>
+                                <a:srgbClr val="FFFFFF"/>
+                              </a:solidFill>
+                            </a14:hiddenFill>
+                          </a:ext>
+                        </a:extLst>
+                      </p:spPr>
+                    </p:pic>
+                  </p:oleObj>
+                </mc:Fallback>
+              </mc:AlternateContent>
             </a:graphicData>
           </a:graphic>
         </p:graphicFrame>
@@ -21205,10 +21610,10 @@
           <p:nvPr/>
         </p:nvPicPr>
         <p:blipFill>
-          <a:blip r:embed="rId13" cstate="print">
+          <a:blip r:embed="rId17" cstate="print">
             <a:extLst>
               <a:ext uri="{28A0092B-C50C-407E-A947-70E740481C1C}">
-                <a14:useLocalDpi xmlns="" xmlns:a14="http://schemas.microsoft.com/office/drawing/2010/main" val="0"/>
+                <a14:useLocalDpi xmlns:a14="http://schemas.microsoft.com/office/drawing/2010/main" val="0"/>
               </a:ext>
             </a:extLst>
           </a:blip>
@@ -21228,7 +21633,7 @@
           <a:noFill/>
           <a:extLst>
             <a:ext uri="{909E8E84-426E-40DD-AFC4-6F175D3DCCD1}">
-              <a14:hiddenFill xmlns="" xmlns:a14="http://schemas.microsoft.com/office/drawing/2010/main">
+              <a14:hiddenFill xmlns:a14="http://schemas.microsoft.com/office/drawing/2010/main">
                 <a:solidFill>
                   <a:srgbClr val="FFFFFF"/>
                 </a:solidFill>
@@ -21410,10 +21815,10 @@
           <p:nvPr/>
         </p:nvPicPr>
         <p:blipFill>
-          <a:blip r:embed="rId14" cstate="print">
+          <a:blip r:embed="rId18" cstate="print">
             <a:extLst>
               <a:ext uri="{28A0092B-C50C-407E-A947-70E740481C1C}">
-                <a14:useLocalDpi xmlns="" xmlns:a14="http://schemas.microsoft.com/office/drawing/2010/main" val="0"/>
+                <a14:useLocalDpi xmlns:a14="http://schemas.microsoft.com/office/drawing/2010/main" val="0"/>
               </a:ext>
             </a:extLst>
           </a:blip>
@@ -21434,7 +21839,7 @@
     </p:spTree>
     <p:extLst>
       <p:ext uri="{BB962C8B-B14F-4D97-AF65-F5344CB8AC3E}">
-        <p14:creationId xmlns="" xmlns:p14="http://schemas.microsoft.com/office/powerpoint/2010/main" val="3388600629"/>
+        <p14:creationId xmlns:p14="http://schemas.microsoft.com/office/powerpoint/2010/main" val="3388600629"/>
       </p:ext>
     </p:extLst>
   </p:cSld>
@@ -22978,7 +23383,7 @@
               <p:nvPr userDrawn="1">
                 <p:extLst>
                   <p:ext uri="{D42A27DB-BD31-4B8C-83A1-F6EECF244321}">
-                    <p14:modId xmlns="" xmlns:p14="http://schemas.microsoft.com/office/powerpoint/2010/main" val="3838789985"/>
+                    <p14:modId xmlns:p14="http://schemas.microsoft.com/office/powerpoint/2010/main" val="3838789985"/>
                   </p:ext>
                 </p:extLst>
               </p:nvPr>
@@ -22989,9 +23394,59 @@
             </p:xfrm>
             <a:graphic>
               <a:graphicData uri="http://schemas.openxmlformats.org/presentationml/2006/ole">
-                <p:oleObj spid="_x0000_s6182" name="Image" r:id="rId8" imgW="1828571" imgH="1117460" progId="">
-                  <p:embed/>
-                </p:oleObj>
+                <mc:AlternateContent xmlns:mc="http://schemas.openxmlformats.org/markup-compatibility/2006">
+                  <mc:Choice xmlns:v="urn:schemas-microsoft-com:vml" Requires="v">
+                    <p:oleObj spid="_x0000_s6190" name="Image" r:id="rId8" imgW="1828571" imgH="1117460" progId="">
+                      <p:embed/>
+                    </p:oleObj>
+                  </mc:Choice>
+                  <mc:Fallback>
+                    <p:oleObj name="Image" r:id="rId8" imgW="1828571" imgH="1117460" progId="">
+                      <p:embed/>
+                      <p:pic>
+                        <p:nvPicPr>
+                          <p:cNvPr id="0" name="Picture 38"/>
+                          <p:cNvPicPr>
+                            <a:picLocks noChangeAspect="1" noChangeArrowheads="1"/>
+                          </p:cNvPicPr>
+                          <p:nvPr/>
+                        </p:nvPicPr>
+                        <p:blipFill>
+                          <a:blip r:embed="rId9">
+                            <a:extLst>
+                              <a:ext uri="{28A0092B-C50C-407E-A947-70E740481C1C}">
+                                <a14:useLocalDpi xmlns:a14="http://schemas.microsoft.com/office/drawing/2010/main" val="0"/>
+                              </a:ext>
+                            </a:extLst>
+                          </a:blip>
+                          <a:srcRect/>
+                          <a:stretch>
+                            <a:fillRect/>
+                          </a:stretch>
+                        </p:blipFill>
+                        <p:spPr bwMode="auto">
+                          <a:xfrm>
+                            <a:off x="-4533347" y="12734142"/>
+                            <a:ext cx="1828800" cy="1117600"/>
+                          </a:xfrm>
+                          <a:prstGeom prst="rect">
+                            <a:avLst/>
+                          </a:prstGeom>
+                          <a:noFill/>
+                          <a:extLst>
+                            <a:ext uri="{909E8E84-426E-40DD-AFC4-6F175D3DCCD1}">
+                              <a14:hiddenFill xmlns:a14="http://schemas.microsoft.com/office/drawing/2010/main">
+                                <a:solidFill>
+                                  <a:srgbClr val="FFFFFF"/>
+                                </a:solidFill>
+                              </a14:hiddenFill>
+                            </a:ext>
+                          </a:extLst>
+                        </p:spPr>
+                      </p:pic>
+                    </p:oleObj>
+                  </mc:Fallback>
+                </mc:AlternateContent>
               </a:graphicData>
             </a:graphic>
           </p:graphicFrame>
@@ -23004,7 +23459,7 @@
               <p:nvPr userDrawn="1">
                 <p:extLst>
                   <p:ext uri="{D42A27DB-BD31-4B8C-83A1-F6EECF244321}">
-                    <p14:modId xmlns="" xmlns:p14="http://schemas.microsoft.com/office/powerpoint/2010/main" val="195376788"/>
+                    <p14:modId xmlns:p14="http://schemas.microsoft.com/office/powerpoint/2010/main" val="195376788"/>
                   </p:ext>
                 </p:extLst>
               </p:nvPr>
@@ -23015,9 +23470,59 @@
             </p:xfrm>
             <a:graphic>
               <a:graphicData uri="http://schemas.openxmlformats.org/presentationml/2006/ole">
-                <p:oleObj spid="_x0000_s6183" name="Image" r:id="rId9" imgW="1828571" imgH="1117460" progId="">
-                  <p:embed/>
-                </p:oleObj>
+                <mc:AlternateContent xmlns:mc="http://schemas.openxmlformats.org/markup-compatibility/2006">
+                  <mc:Choice xmlns:v="urn:schemas-microsoft-com:vml" Requires="v">
+                    <p:oleObj spid="_x0000_s6191" name="Image" r:id="rId10" imgW="1828571" imgH="1117460" progId="">
+                      <p:embed/>
+                    </p:oleObj>
+                  </mc:Choice>
+                  <mc:Fallback>
+                    <p:oleObj name="Image" r:id="rId10" imgW="1828571" imgH="1117460" progId="">
+                      <p:embed/>
+                      <p:pic>
+                        <p:nvPicPr>
+                          <p:cNvPr id="0" name="Picture 39"/>
+                          <p:cNvPicPr>
+                            <a:picLocks noChangeAspect="1" noChangeArrowheads="1"/>
+                          </p:cNvPicPr>
+                          <p:nvPr/>
+                        </p:nvPicPr>
+                        <p:blipFill>
+                          <a:blip r:embed="rId11">
+                            <a:extLst>
+                              <a:ext uri="{28A0092B-C50C-407E-A947-70E740481C1C}">
+                                <a14:useLocalDpi xmlns:a14="http://schemas.microsoft.com/office/drawing/2010/main" val="0"/>
+                              </a:ext>
+                            </a:extLst>
+                          </a:blip>
+                          <a:srcRect/>
+                          <a:stretch>
+                            <a:fillRect/>
+                          </a:stretch>
+                        </p:blipFill>
+                        <p:spPr bwMode="auto">
+                          <a:xfrm>
+                            <a:off x="-2456641" y="12737835"/>
+                            <a:ext cx="1828800" cy="1117600"/>
+                          </a:xfrm>
+                          <a:prstGeom prst="rect">
+                            <a:avLst/>
+                          </a:prstGeom>
+                          <a:noFill/>
+                          <a:extLst>
+                            <a:ext uri="{909E8E84-426E-40DD-AFC4-6F175D3DCCD1}">
+                              <a14:hiddenFill xmlns:a14="http://schemas.microsoft.com/office/drawing/2010/main">
+                                <a:solidFill>
+                                  <a:srgbClr val="FFFFFF"/>
+                                </a:solidFill>
+                              </a14:hiddenFill>
+                            </a:ext>
+                          </a:extLst>
+                        </p:spPr>
+                      </p:pic>
+                    </p:oleObj>
+                  </mc:Fallback>
+                </mc:AlternateContent>
               </a:graphicData>
             </a:graphic>
           </p:graphicFrame>
@@ -23995,7 +24500,7 @@
             <p:nvPr userDrawn="1">
               <p:extLst>
                 <p:ext uri="{D42A27DB-BD31-4B8C-83A1-F6EECF244321}">
-                  <p14:modId xmlns="" xmlns:p14="http://schemas.microsoft.com/office/powerpoint/2010/main" val="827898972"/>
+                  <p14:modId xmlns:p14="http://schemas.microsoft.com/office/powerpoint/2010/main" val="827898972"/>
                 </p:ext>
               </p:extLst>
             </p:nvPr>
@@ -24006,9 +24511,59 @@
           </p:xfrm>
           <a:graphic>
             <a:graphicData uri="http://schemas.openxmlformats.org/presentationml/2006/ole">
-              <p:oleObj spid="_x0000_s6184" name="Image" r:id="rId10" imgW="4571429" imgH="1688889" progId="">
-                <p:embed/>
-              </p:oleObj>
+              <mc:AlternateContent xmlns:mc="http://schemas.openxmlformats.org/markup-compatibility/2006">
+                <mc:Choice xmlns:v="urn:schemas-microsoft-com:vml" Requires="v">
+                  <p:oleObj spid="_x0000_s6192" name="Image" r:id="rId12" imgW="4571429" imgH="1688889" progId="">
+                    <p:embed/>
+                  </p:oleObj>
+                </mc:Choice>
+                <mc:Fallback>
+                  <p:oleObj name="Image" r:id="rId12" imgW="4571429" imgH="1688889" progId="">
+                    <p:embed/>
+                    <p:pic>
+                      <p:nvPicPr>
+                        <p:cNvPr id="0" name="Picture 40"/>
+                        <p:cNvPicPr>
+                          <a:picLocks noChangeAspect="1" noChangeArrowheads="1"/>
+                        </p:cNvPicPr>
+                        <p:nvPr/>
+                      </p:nvPicPr>
+                      <p:blipFill>
+                        <a:blip r:embed="rId13">
+                          <a:extLst>
+                            <a:ext uri="{28A0092B-C50C-407E-A947-70E740481C1C}">
+                              <a14:useLocalDpi xmlns:a14="http://schemas.microsoft.com/office/drawing/2010/main" val="0"/>
+                            </a:ext>
+                          </a:extLst>
+                        </a:blip>
+                        <a:srcRect/>
+                        <a:stretch>
+                          <a:fillRect/>
+                        </a:stretch>
+                      </p:blipFill>
+                      <p:spPr bwMode="auto">
+                        <a:xfrm>
+                          <a:off x="46915679" y="3672008"/>
+                          <a:ext cx="5586150" cy="2063772"/>
+                        </a:xfrm>
+                        <a:prstGeom prst="rect">
+                          <a:avLst/>
+                        </a:prstGeom>
+                        <a:noFill/>
+                        <a:extLst>
+                          <a:ext uri="{909E8E84-426E-40DD-AFC4-6F175D3DCCD1}">
+                            <a14:hiddenFill xmlns:a14="http://schemas.microsoft.com/office/drawing/2010/main">
+                              <a:solidFill>
+                                <a:srgbClr val="FFFFFF"/>
+                              </a:solidFill>
+                            </a14:hiddenFill>
+                          </a:ext>
+                        </a:extLst>
+                      </p:spPr>
+                    </p:pic>
+                  </p:oleObj>
+                </mc:Fallback>
+              </mc:AlternateContent>
             </a:graphicData>
           </a:graphic>
         </p:graphicFrame>
@@ -24021,7 +24576,7 @@
             <p:nvPr userDrawn="1"/>
           </p:nvPicPr>
           <p:blipFill>
-            <a:blip r:embed="rId11" cstate="print"/>
+            <a:blip r:embed="rId14" cstate="print"/>
             <a:stretch>
               <a:fillRect/>
             </a:stretch>
@@ -24048,7 +24603,7 @@
             <p:nvPr userDrawn="1">
               <p:extLst>
                 <p:ext uri="{D42A27DB-BD31-4B8C-83A1-F6EECF244321}">
-                  <p14:modId xmlns="" xmlns:p14="http://schemas.microsoft.com/office/powerpoint/2010/main" val="1903822826"/>
+                  <p14:modId xmlns:p14="http://schemas.microsoft.com/office/powerpoint/2010/main" val="1903822826"/>
                 </p:ext>
               </p:extLst>
             </p:nvPr>
@@ -24059,9 +24614,59 @@
           </p:xfrm>
           <a:graphic>
             <a:graphicData uri="http://schemas.openxmlformats.org/presentationml/2006/ole">
-              <p:oleObj spid="_x0000_s6185" name="Image" r:id="rId12" imgW="1574603" imgH="1053968" progId="">
-                <p:embed/>
-              </p:oleObj>
+              <mc:AlternateContent xmlns:mc="http://schemas.openxmlformats.org/markup-compatibility/2006">
+                <mc:Choice xmlns:v="urn:schemas-microsoft-com:vml" Requires="v">
+                  <p:oleObj spid="_x0000_s6193" name="Image" r:id="rId15" imgW="1574603" imgH="1053968" progId="">
+                    <p:embed/>
+                  </p:oleObj>
+                </mc:Choice>
+                <mc:Fallback>
+                  <p:oleObj name="Image" r:id="rId15" imgW="1574603" imgH="1053968" progId="">
+                    <p:embed/>
+                    <p:pic>
+                      <p:nvPicPr>
+                        <p:cNvPr id="0" name="Picture 41"/>
+                        <p:cNvPicPr>
+                          <a:picLocks noChangeAspect="1" noChangeArrowheads="1"/>
+                        </p:cNvPicPr>
+                        <p:nvPr/>
+                      </p:nvPicPr>
+                      <p:blipFill>
+                        <a:blip r:embed="rId16">
+                          <a:extLst>
+                            <a:ext uri="{28A0092B-C50C-407E-A947-70E740481C1C}">
+                              <a14:useLocalDpi xmlns:a14="http://schemas.microsoft.com/office/drawing/2010/main" val="0"/>
+                            </a:ext>
+                          </a:extLst>
+                        </a:blip>
+                        <a:srcRect/>
+                        <a:stretch>
+                          <a:fillRect/>
+                        </a:stretch>
+                      </p:blipFill>
+                      <p:spPr bwMode="auto">
+                        <a:xfrm>
+                          <a:off x="44629619" y="12347263"/>
+                          <a:ext cx="1482266" cy="992162"/>
+                        </a:xfrm>
+                        <a:prstGeom prst="rect">
+                          <a:avLst/>
+                        </a:prstGeom>
+                        <a:noFill/>
+                        <a:extLst>
+                          <a:ext uri="{909E8E84-426E-40DD-AFC4-6F175D3DCCD1}">
+                            <a14:hiddenFill xmlns:a14="http://schemas.microsoft.com/office/drawing/2010/main">
+                              <a:solidFill>
+                                <a:srgbClr val="FFFFFF"/>
+                              </a:solidFill>
+                            </a14:hiddenFill>
+                          </a:ext>
+                        </a:extLst>
+                      </p:spPr>
+                    </p:pic>
+                  </p:oleObj>
+                </mc:Fallback>
+              </mc:AlternateContent>
             </a:graphicData>
           </a:graphic>
         </p:graphicFrame>
@@ -24219,10 +24824,10 @@
           <p:nvPr/>
         </p:nvPicPr>
         <p:blipFill>
-          <a:blip r:embed="rId13" cstate="print">
+          <a:blip r:embed="rId17" cstate="print">
             <a:extLst>
               <a:ext uri="{28A0092B-C50C-407E-A947-70E740481C1C}">
-                <a14:useLocalDpi xmlns="" xmlns:a14="http://schemas.microsoft.com/office/drawing/2010/main" val="0"/>
+                <a14:useLocalDpi xmlns:a14="http://schemas.microsoft.com/office/drawing/2010/main" val="0"/>
               </a:ext>
             </a:extLst>
           </a:blip>
@@ -24242,7 +24847,7 @@
           <a:noFill/>
           <a:extLst>
             <a:ext uri="{909E8E84-426E-40DD-AFC4-6F175D3DCCD1}">
-              <a14:hiddenFill xmlns="" xmlns:a14="http://schemas.microsoft.com/office/drawing/2010/main">
+              <a14:hiddenFill xmlns:a14="http://schemas.microsoft.com/office/drawing/2010/main">
                 <a:solidFill>
                   <a:srgbClr val="FFFFFF"/>
                 </a:solidFill>
@@ -24395,10 +25000,10 @@
           <p:nvPr/>
         </p:nvPicPr>
         <p:blipFill>
-          <a:blip r:embed="rId14" cstate="print">
+          <a:blip r:embed="rId18" cstate="print">
             <a:extLst>
               <a:ext uri="{28A0092B-C50C-407E-A947-70E740481C1C}">
-                <a14:useLocalDpi xmlns="" xmlns:a14="http://schemas.microsoft.com/office/drawing/2010/main" val="0"/>
+                <a14:useLocalDpi xmlns:a14="http://schemas.microsoft.com/office/drawing/2010/main" val="0"/>
               </a:ext>
             </a:extLst>
           </a:blip>
@@ -24419,7 +25024,7 @@
     </p:spTree>
     <p:extLst>
       <p:ext uri="{BB962C8B-B14F-4D97-AF65-F5344CB8AC3E}">
-        <p14:creationId xmlns="" xmlns:p14="http://schemas.microsoft.com/office/powerpoint/2010/main" val="118203387"/>
+        <p14:creationId xmlns:p14="http://schemas.microsoft.com/office/powerpoint/2010/main" val="118203387"/>
       </p:ext>
     </p:extLst>
   </p:cSld>
@@ -27476,7 +28081,7 @@
             <a:fld id="{16C01193-8287-4834-A286-6B880643E934}" type="datetime4">
               <a:rPr lang="en-US" smtClean="0"/>
               <a:pPr/>
-              <a:t>May 28, 2015</a:t>
+              <a:t>May 29, 2015</a:t>
             </a:fld>
             <a:endParaRPr lang="en-US"/>
           </a:p>
@@ -28147,10 +28752,10 @@
           </a:p>
           <a:p>
             <a:r>
-              <a:rPr lang="en-US" sz="1750" u="sng" dirty="0" smtClean="0"/>
+              <a:rPr lang="en-US" sz="1750" b="1" u="sng" dirty="0" smtClean="0"/>
               <a:t>How this helps the target user:</a:t>
             </a:r>
-            <a:endParaRPr lang="en-US" sz="1750" u="sng" dirty="0"/>
+            <a:endParaRPr lang="en-US" sz="1750" b="1" u="sng" dirty="0"/>
           </a:p>
           <a:p>
             <a:pPr>
@@ -28439,7 +29044,7 @@
         <p:spPr>
           <a:xfrm>
             <a:off x="19621500" y="13855809"/>
-            <a:ext cx="6282531" cy="1824604"/>
+            <a:ext cx="6282531" cy="2132381"/>
           </a:xfrm>
         </p:spPr>
         <p:style>
@@ -28462,7 +29067,11 @@
           <a:p>
             <a:r>
               <a:rPr lang="en-US" sz="2000" dirty="0" smtClean="0"/>
-              <a:t>Right now I am just finishing up with input system and hope to get started on the logic to resolve all of the orders. If I do that fast enough I would add some animation to show the user which commands resolve and which ones don’t.</a:t>
+              <a:t>Some long term goals for this project would be to create a server and a complete menu with settings and save options, as well as adding some complicated features to the game like air strikes or changing units from a navy to an army. Basicall</a:t>
+            </a:r>
+            <a:r>
+              <a:rPr lang="en-US" sz="2000" dirty="0" smtClean="0"/>
+              <a:t>y adding a lot of features to make it look nicer.</a:t>
             </a:r>
             <a:endParaRPr lang="en-US" sz="2000" dirty="0"/>
           </a:p>
@@ -28480,7 +29089,7 @@
         </p:nvSpPr>
         <p:spPr>
           <a:xfrm>
-            <a:off x="19615150" y="16061413"/>
+            <a:off x="19615150" y="16448154"/>
             <a:ext cx="6279386" cy="468246"/>
           </a:xfrm>
         </p:spPr>
@@ -28508,7 +29117,7 @@
         </p:nvSpPr>
         <p:spPr>
           <a:xfrm>
-            <a:off x="19612769" y="16534791"/>
+            <a:off x="19612769" y="16947147"/>
             <a:ext cx="6282531" cy="655053"/>
           </a:xfrm>
         </p:spPr>
@@ -30035,7 +30644,7 @@
           <a:blip r:embed="rId3" cstate="print">
             <a:extLst>
               <a:ext uri="{28A0092B-C50C-407E-A947-70E740481C1C}">
-                <a14:useLocalDpi xmlns="" xmlns:a14="http://schemas.microsoft.com/office/drawing/2010/main" val="0"/>
+                <a14:useLocalDpi xmlns:a14="http://schemas.microsoft.com/office/drawing/2010/main" val="0"/>
               </a:ext>
             </a:extLst>
           </a:blip>
@@ -30044,8 +30653,8 @@
         </p:blipFill>
         <p:spPr bwMode="auto">
           <a:xfrm>
-            <a:off x="9639300" y="11948679"/>
-            <a:ext cx="8153400" cy="6246334"/>
+            <a:off x="9570725" y="12092623"/>
+            <a:ext cx="8290551" cy="6351406"/>
           </a:xfrm>
           <a:prstGeom prst="rect">
             <a:avLst/>
@@ -30056,14 +30665,14 @@
           </a:ln>
           <a:extLst>
             <a:ext uri="{909E8E84-426E-40DD-AFC4-6F175D3DCCD1}">
-              <a14:hiddenFill xmlns="" xmlns:a14="http://schemas.microsoft.com/office/drawing/2010/main">
+              <a14:hiddenFill xmlns:a14="http://schemas.microsoft.com/office/drawing/2010/main">
                 <a:solidFill>
                   <a:schemeClr val="accent1"/>
                 </a:solidFill>
               </a14:hiddenFill>
             </a:ext>
             <a:ext uri="{91240B29-F687-4F45-9708-019B960494DF}">
-              <a14:hiddenLine xmlns="" xmlns:a14="http://schemas.microsoft.com/office/drawing/2010/main" w="9525">
+              <a14:hiddenLine xmlns:a14="http://schemas.microsoft.com/office/drawing/2010/main" w="9525">
                 <a:solidFill>
                   <a:schemeClr val="tx1"/>
                 </a:solidFill>
@@ -30091,7 +30700,7 @@
         </p:blipFill>
         <p:spPr>
           <a:xfrm rot="495021">
-            <a:off x="19507200" y="17602200"/>
+            <a:off x="18729876" y="17407877"/>
             <a:ext cx="914400" cy="914400"/>
           </a:xfrm>
           <a:prstGeom prst="rect">
@@ -30167,7 +30776,7 @@
         </p:blipFill>
         <p:spPr>
           <a:xfrm rot="20975893">
-            <a:off x="22936200" y="17449800"/>
+            <a:off x="8078366" y="16000835"/>
             <a:ext cx="914400" cy="914400"/>
           </a:xfrm>
           <a:prstGeom prst="rect">
@@ -30360,7 +30969,7 @@
     </p:spTree>
     <p:extLst>
       <p:ext uri="{BB962C8B-B14F-4D97-AF65-F5344CB8AC3E}">
-        <p14:creationId xmlns="" xmlns:p14="http://schemas.microsoft.com/office/powerpoint/2010/main" val="2550174280"/>
+        <p14:creationId xmlns:p14="http://schemas.microsoft.com/office/powerpoint/2010/main" val="2550174280"/>
       </p:ext>
     </p:extLst>
   </p:cSld>

</xml_diff>

<commit_message>
Added this class to move units around.
</commit_message>
<xml_diff>
--- a/Helping Files/Project Poster Official.pptx
+++ b/Helping Files/Project Poster Official.pptx
@@ -17008,7 +17008,7 @@
               <a:graphicData uri="http://schemas.openxmlformats.org/presentationml/2006/ole">
                 <mc:AlternateContent xmlns:mc="http://schemas.openxmlformats.org/markup-compatibility/2006">
                   <mc:Choice xmlns:v="urn:schemas-microsoft-com:vml" Requires="v">
-                    <p:oleObj spid="_x0000_s7210" name="Image" r:id="rId9" imgW="1828571" imgH="1117460" progId="">
+                    <p:oleObj spid="_x0000_s7214" name="Image" r:id="rId9" imgW="1828571" imgH="1117460" progId="">
                       <p:embed/>
                     </p:oleObj>
                   </mc:Choice>
@@ -17084,7 +17084,7 @@
               <a:graphicData uri="http://schemas.openxmlformats.org/presentationml/2006/ole">
                 <mc:AlternateContent xmlns:mc="http://schemas.openxmlformats.org/markup-compatibility/2006">
                   <mc:Choice xmlns:v="urn:schemas-microsoft-com:vml" Requires="v">
-                    <p:oleObj spid="_x0000_s7211" name="Image" r:id="rId11" imgW="1828571" imgH="1117460" progId="">
+                    <p:oleObj spid="_x0000_s7215" name="Image" r:id="rId11" imgW="1828571" imgH="1117460" progId="">
                       <p:embed/>
                     </p:oleObj>
                   </mc:Choice>
@@ -18125,7 +18125,7 @@
             <a:graphicData uri="http://schemas.openxmlformats.org/presentationml/2006/ole">
               <mc:AlternateContent xmlns:mc="http://schemas.openxmlformats.org/markup-compatibility/2006">
                 <mc:Choice xmlns:v="urn:schemas-microsoft-com:vml" Requires="v">
-                  <p:oleObj spid="_x0000_s7212" name="Image" r:id="rId13" imgW="4571429" imgH="1688889" progId="">
+                  <p:oleObj spid="_x0000_s7216" name="Image" r:id="rId13" imgW="4571429" imgH="1688889" progId="">
                     <p:embed/>
                   </p:oleObj>
                 </mc:Choice>
@@ -18228,7 +18228,7 @@
             <a:graphicData uri="http://schemas.openxmlformats.org/presentationml/2006/ole">
               <mc:AlternateContent xmlns:mc="http://schemas.openxmlformats.org/markup-compatibility/2006">
                 <mc:Choice xmlns:v="urn:schemas-microsoft-com:vml" Requires="v">
-                  <p:oleObj spid="_x0000_s7213" name="Image" r:id="rId16" imgW="1574603" imgH="1053968" progId="">
+                  <p:oleObj spid="_x0000_s7217" name="Image" r:id="rId16" imgW="1574603" imgH="1053968" progId="">
                     <p:embed/>
                   </p:oleObj>
                 </mc:Choice>
@@ -20182,7 +20182,7 @@
               <a:graphicData uri="http://schemas.openxmlformats.org/presentationml/2006/ole">
                 <mc:AlternateContent xmlns:mc="http://schemas.openxmlformats.org/markup-compatibility/2006">
                   <mc:Choice xmlns:v="urn:schemas-microsoft-com:vml" Requires="v">
-                    <p:oleObj spid="_x0000_s5166" name="Image" r:id="rId8" imgW="1828571" imgH="1117460" progId="">
+                    <p:oleObj spid="_x0000_s5170" name="Image" r:id="rId8" imgW="1828571" imgH="1117460" progId="">
                       <p:embed/>
                     </p:oleObj>
                   </mc:Choice>
@@ -20258,7 +20258,7 @@
               <a:graphicData uri="http://schemas.openxmlformats.org/presentationml/2006/ole">
                 <mc:AlternateContent xmlns:mc="http://schemas.openxmlformats.org/markup-compatibility/2006">
                   <mc:Choice xmlns:v="urn:schemas-microsoft-com:vml" Requires="v">
-                    <p:oleObj spid="_x0000_s5167" name="Image" r:id="rId10" imgW="1828571" imgH="1117460" progId="">
+                    <p:oleObj spid="_x0000_s5171" name="Image" r:id="rId10" imgW="1828571" imgH="1117460" progId="">
                       <p:embed/>
                     </p:oleObj>
                   </mc:Choice>
@@ -21299,7 +21299,7 @@
             <a:graphicData uri="http://schemas.openxmlformats.org/presentationml/2006/ole">
               <mc:AlternateContent xmlns:mc="http://schemas.openxmlformats.org/markup-compatibility/2006">
                 <mc:Choice xmlns:v="urn:schemas-microsoft-com:vml" Requires="v">
-                  <p:oleObj spid="_x0000_s5168" name="Image" r:id="rId12" imgW="4571429" imgH="1688889" progId="">
+                  <p:oleObj spid="_x0000_s5172" name="Image" r:id="rId12" imgW="4571429" imgH="1688889" progId="">
                     <p:embed/>
                   </p:oleObj>
                 </mc:Choice>
@@ -21402,7 +21402,7 @@
             <a:graphicData uri="http://schemas.openxmlformats.org/presentationml/2006/ole">
               <mc:AlternateContent xmlns:mc="http://schemas.openxmlformats.org/markup-compatibility/2006">
                 <mc:Choice xmlns:v="urn:schemas-microsoft-com:vml" Requires="v">
-                  <p:oleObj spid="_x0000_s5169" name="Image" r:id="rId15" imgW="1574603" imgH="1053968" progId="">
+                  <p:oleObj spid="_x0000_s5173" name="Image" r:id="rId15" imgW="1574603" imgH="1053968" progId="">
                     <p:embed/>
                   </p:oleObj>
                 </mc:Choice>
@@ -23396,7 +23396,7 @@
               <a:graphicData uri="http://schemas.openxmlformats.org/presentationml/2006/ole">
                 <mc:AlternateContent xmlns:mc="http://schemas.openxmlformats.org/markup-compatibility/2006">
                   <mc:Choice xmlns:v="urn:schemas-microsoft-com:vml" Requires="v">
-                    <p:oleObj spid="_x0000_s6190" name="Image" r:id="rId8" imgW="1828571" imgH="1117460" progId="">
+                    <p:oleObj spid="_x0000_s6194" name="Image" r:id="rId8" imgW="1828571" imgH="1117460" progId="">
                       <p:embed/>
                     </p:oleObj>
                   </mc:Choice>
@@ -23472,7 +23472,7 @@
               <a:graphicData uri="http://schemas.openxmlformats.org/presentationml/2006/ole">
                 <mc:AlternateContent xmlns:mc="http://schemas.openxmlformats.org/markup-compatibility/2006">
                   <mc:Choice xmlns:v="urn:schemas-microsoft-com:vml" Requires="v">
-                    <p:oleObj spid="_x0000_s6191" name="Image" r:id="rId10" imgW="1828571" imgH="1117460" progId="">
+                    <p:oleObj spid="_x0000_s6195" name="Image" r:id="rId10" imgW="1828571" imgH="1117460" progId="">
                       <p:embed/>
                     </p:oleObj>
                   </mc:Choice>
@@ -24513,7 +24513,7 @@
             <a:graphicData uri="http://schemas.openxmlformats.org/presentationml/2006/ole">
               <mc:AlternateContent xmlns:mc="http://schemas.openxmlformats.org/markup-compatibility/2006">
                 <mc:Choice xmlns:v="urn:schemas-microsoft-com:vml" Requires="v">
-                  <p:oleObj spid="_x0000_s6192" name="Image" r:id="rId12" imgW="4571429" imgH="1688889" progId="">
+                  <p:oleObj spid="_x0000_s6196" name="Image" r:id="rId12" imgW="4571429" imgH="1688889" progId="">
                     <p:embed/>
                   </p:oleObj>
                 </mc:Choice>
@@ -24616,7 +24616,7 @@
             <a:graphicData uri="http://schemas.openxmlformats.org/presentationml/2006/ole">
               <mc:AlternateContent xmlns:mc="http://schemas.openxmlformats.org/markup-compatibility/2006">
                 <mc:Choice xmlns:v="urn:schemas-microsoft-com:vml" Requires="v">
-                  <p:oleObj spid="_x0000_s6193" name="Image" r:id="rId15" imgW="1574603" imgH="1053968" progId="">
+                  <p:oleObj spid="_x0000_s6197" name="Image" r:id="rId15" imgW="1574603" imgH="1053968" progId="">
                     <p:embed/>
                   </p:oleObj>
                 </mc:Choice>

</xml_diff>